<commit_message>
Completed the Decision Tree.
</commit_message>
<xml_diff>
--- a/Lab Programs/Lab Program-Algorithms.pptx
+++ b/Lab Programs/Lab Program-Algorithms.pptx
@@ -160,6 +160,228 @@
 </p:presentation>
 </file>
 
+<file path=ppt/revisionInfo.xml><?xml version="1.0" encoding="utf-8"?>
+<p1510:revInfo xmlns:a="http://schemas.openxmlformats.org/drawingml/2006/main" xmlns:r="http://schemas.openxmlformats.org/officeDocument/2006/relationships" xmlns:p1510="http://schemas.microsoft.com/office/powerpoint/2015/10/main">
+  <p1510:revLst>
+    <p1510:client id="{B158E975-0E20-43B3-8221-44D3D217A6A1}" v="13" dt="2025-06-27T18:10:00.824"/>
+  </p1510:revLst>
+</p1510:revInfo>
+</file>
+
+<file path=ppt/changesInfos/changesInfo1.xml><?xml version="1.0" encoding="utf-8"?>
+<pc:chgInfo xmlns:a="http://schemas.openxmlformats.org/drawingml/2006/main" xmlns:r="http://schemas.openxmlformats.org/officeDocument/2006/relationships" xmlns:ac="http://schemas.microsoft.com/office/drawing/2013/main/command" xmlns:pc="http://schemas.microsoft.com/office/powerpoint/2013/main/command">
+  <pc:docChgLst>
+    <pc:chgData name="Pramod Naik" userId="ceb6df04-ef15-4d9b-a141-998a03559d75" providerId="ADAL" clId="{B158E975-0E20-43B3-8221-44D3D217A6A1}"/>
+    <pc:docChg chg="undo custSel modSld">
+      <pc:chgData name="Pramod Naik" userId="ceb6df04-ef15-4d9b-a141-998a03559d75" providerId="ADAL" clId="{B158E975-0E20-43B3-8221-44D3D217A6A1}" dt="2025-06-27T18:10:46.986" v="201" actId="20577"/>
+      <pc:docMkLst>
+        <pc:docMk/>
+      </pc:docMkLst>
+      <pc:sldChg chg="modSp mod">
+        <pc:chgData name="Pramod Naik" userId="ceb6df04-ef15-4d9b-a141-998a03559d75" providerId="ADAL" clId="{B158E975-0E20-43B3-8221-44D3D217A6A1}" dt="2025-06-27T05:53:45.761" v="48" actId="207"/>
+        <pc:sldMkLst>
+          <pc:docMk/>
+          <pc:sldMk cId="769431239" sldId="422"/>
+        </pc:sldMkLst>
+        <pc:spChg chg="mod">
+          <ac:chgData name="Pramod Naik" userId="ceb6df04-ef15-4d9b-a141-998a03559d75" providerId="ADAL" clId="{B158E975-0E20-43B3-8221-44D3D217A6A1}" dt="2025-06-27T05:53:45.761" v="48" actId="207"/>
+          <ac:spMkLst>
+            <pc:docMk/>
+            <pc:sldMk cId="769431239" sldId="422"/>
+            <ac:spMk id="3" creationId="{686DB707-FE8D-6C55-E955-6251D807F941}"/>
+          </ac:spMkLst>
+        </pc:spChg>
+      </pc:sldChg>
+      <pc:sldChg chg="addSp delSp modSp mod">
+        <pc:chgData name="Pramod Naik" userId="ceb6df04-ef15-4d9b-a141-998a03559d75" providerId="ADAL" clId="{B158E975-0E20-43B3-8221-44D3D217A6A1}" dt="2025-06-23T05:01:45.544" v="6" actId="14100"/>
+        <pc:sldMkLst>
+          <pc:docMk/>
+          <pc:sldMk cId="729572168" sldId="879"/>
+        </pc:sldMkLst>
+        <pc:spChg chg="add mod">
+          <ac:chgData name="Pramod Naik" userId="ceb6df04-ef15-4d9b-a141-998a03559d75" providerId="ADAL" clId="{B158E975-0E20-43B3-8221-44D3D217A6A1}" dt="2025-06-23T05:01:34.343" v="3" actId="478"/>
+          <ac:spMkLst>
+            <pc:docMk/>
+            <pc:sldMk cId="729572168" sldId="879"/>
+            <ac:spMk id="6" creationId="{E676727A-A98A-CFFE-78B9-67953E38B818}"/>
+          </ac:spMkLst>
+        </pc:spChg>
+        <pc:picChg chg="add mod">
+          <ac:chgData name="Pramod Naik" userId="ceb6df04-ef15-4d9b-a141-998a03559d75" providerId="ADAL" clId="{B158E975-0E20-43B3-8221-44D3D217A6A1}" dt="2025-06-23T05:01:45.544" v="6" actId="14100"/>
+          <ac:picMkLst>
+            <pc:docMk/>
+            <pc:sldMk cId="729572168" sldId="879"/>
+            <ac:picMk id="8" creationId="{792885F3-E777-6FF4-A4AE-F9854940E0D7}"/>
+          </ac:picMkLst>
+        </pc:picChg>
+      </pc:sldChg>
+      <pc:sldChg chg="addSp modSp mod">
+        <pc:chgData name="Pramod Naik" userId="ceb6df04-ef15-4d9b-a141-998a03559d75" providerId="ADAL" clId="{B158E975-0E20-43B3-8221-44D3D217A6A1}" dt="2025-06-23T05:03:37.087" v="37" actId="1036"/>
+        <pc:sldMkLst>
+          <pc:docMk/>
+          <pc:sldMk cId="8836026" sldId="880"/>
+        </pc:sldMkLst>
+        <pc:picChg chg="add mod">
+          <ac:chgData name="Pramod Naik" userId="ceb6df04-ef15-4d9b-a141-998a03559d75" providerId="ADAL" clId="{B158E975-0E20-43B3-8221-44D3D217A6A1}" dt="2025-06-23T05:03:37.087" v="37" actId="1036"/>
+          <ac:picMkLst>
+            <pc:docMk/>
+            <pc:sldMk cId="8836026" sldId="880"/>
+            <ac:picMk id="4" creationId="{7242F791-B1DC-AFB4-538A-6DE3F7FBA03F}"/>
+          </ac:picMkLst>
+        </pc:picChg>
+      </pc:sldChg>
+      <pc:sldChg chg="addSp modSp mod">
+        <pc:chgData name="Pramod Naik" userId="ceb6df04-ef15-4d9b-a141-998a03559d75" providerId="ADAL" clId="{B158E975-0E20-43B3-8221-44D3D217A6A1}" dt="2025-06-23T05:04:16.713" v="40" actId="14100"/>
+        <pc:sldMkLst>
+          <pc:docMk/>
+          <pc:sldMk cId="1075212379" sldId="881"/>
+        </pc:sldMkLst>
+        <pc:picChg chg="add mod">
+          <ac:chgData name="Pramod Naik" userId="ceb6df04-ef15-4d9b-a141-998a03559d75" providerId="ADAL" clId="{B158E975-0E20-43B3-8221-44D3D217A6A1}" dt="2025-06-23T05:04:16.713" v="40" actId="14100"/>
+          <ac:picMkLst>
+            <pc:docMk/>
+            <pc:sldMk cId="1075212379" sldId="881"/>
+            <ac:picMk id="4" creationId="{A85D3C9D-27D8-9CF3-A671-5891C564A36F}"/>
+          </ac:picMkLst>
+        </pc:picChg>
+      </pc:sldChg>
+      <pc:sldChg chg="modSp mod">
+        <pc:chgData name="Pramod Naik" userId="ceb6df04-ef15-4d9b-a141-998a03559d75" providerId="ADAL" clId="{B158E975-0E20-43B3-8221-44D3D217A6A1}" dt="2025-06-27T16:46:23.500" v="58" actId="20577"/>
+        <pc:sldMkLst>
+          <pc:docMk/>
+          <pc:sldMk cId="50738775" sldId="882"/>
+        </pc:sldMkLst>
+        <pc:spChg chg="mod">
+          <ac:chgData name="Pramod Naik" userId="ceb6df04-ef15-4d9b-a141-998a03559d75" providerId="ADAL" clId="{B158E975-0E20-43B3-8221-44D3D217A6A1}" dt="2025-06-27T16:46:23.500" v="58" actId="20577"/>
+          <ac:spMkLst>
+            <pc:docMk/>
+            <pc:sldMk cId="50738775" sldId="882"/>
+            <ac:spMk id="3" creationId="{FECAA069-661C-5B1C-0D58-C42A40879667}"/>
+          </ac:spMkLst>
+        </pc:spChg>
+      </pc:sldChg>
+      <pc:sldChg chg="addSp modSp mod">
+        <pc:chgData name="Pramod Naik" userId="ceb6df04-ef15-4d9b-a141-998a03559d75" providerId="ADAL" clId="{B158E975-0E20-43B3-8221-44D3D217A6A1}" dt="2025-06-27T17:29:40.837" v="99" actId="20577"/>
+        <pc:sldMkLst>
+          <pc:docMk/>
+          <pc:sldMk cId="1138678954" sldId="883"/>
+        </pc:sldMkLst>
+        <pc:spChg chg="add">
+          <ac:chgData name="Pramod Naik" userId="ceb6df04-ef15-4d9b-a141-998a03559d75" providerId="ADAL" clId="{B158E975-0E20-43B3-8221-44D3D217A6A1}" dt="2025-06-27T16:46:59.950" v="59"/>
+          <ac:spMkLst>
+            <pc:docMk/>
+            <pc:sldMk cId="1138678954" sldId="883"/>
+            <ac:spMk id="2" creationId="{B074CA9B-0A03-221E-2AD5-8FBE66197A98}"/>
+          </ac:spMkLst>
+        </pc:spChg>
+        <pc:spChg chg="mod">
+          <ac:chgData name="Pramod Naik" userId="ceb6df04-ef15-4d9b-a141-998a03559d75" providerId="ADAL" clId="{B158E975-0E20-43B3-8221-44D3D217A6A1}" dt="2025-06-27T17:29:40.837" v="99" actId="20577"/>
+          <ac:spMkLst>
+            <pc:docMk/>
+            <pc:sldMk cId="1138678954" sldId="883"/>
+            <ac:spMk id="3" creationId="{4035C434-6B87-9919-B399-4690917DE086}"/>
+          </ac:spMkLst>
+        </pc:spChg>
+        <pc:spChg chg="add">
+          <ac:chgData name="Pramod Naik" userId="ceb6df04-ef15-4d9b-a141-998a03559d75" providerId="ADAL" clId="{B158E975-0E20-43B3-8221-44D3D217A6A1}" dt="2025-06-27T16:46:59.950" v="59"/>
+          <ac:spMkLst>
+            <pc:docMk/>
+            <pc:sldMk cId="1138678954" sldId="883"/>
+            <ac:spMk id="4" creationId="{2904943D-D67E-4F7E-3E0E-38C921F374D3}"/>
+          </ac:spMkLst>
+        </pc:spChg>
+        <pc:spChg chg="add">
+          <ac:chgData name="Pramod Naik" userId="ceb6df04-ef15-4d9b-a141-998a03559d75" providerId="ADAL" clId="{B158E975-0E20-43B3-8221-44D3D217A6A1}" dt="2025-06-27T16:46:59.950" v="59"/>
+          <ac:spMkLst>
+            <pc:docMk/>
+            <pc:sldMk cId="1138678954" sldId="883"/>
+            <ac:spMk id="5" creationId="{CC02A80F-000A-DFDD-97A3-E06D084357D1}"/>
+          </ac:spMkLst>
+        </pc:spChg>
+      </pc:sldChg>
+      <pc:sldChg chg="addSp delSp modSp mod modClrScheme chgLayout">
+        <pc:chgData name="Pramod Naik" userId="ceb6df04-ef15-4d9b-a141-998a03559d75" providerId="ADAL" clId="{B158E975-0E20-43B3-8221-44D3D217A6A1}" dt="2025-06-27T18:04:01.784" v="113" actId="14100"/>
+        <pc:sldMkLst>
+          <pc:docMk/>
+          <pc:sldMk cId="657032694" sldId="884"/>
+        </pc:sldMkLst>
+        <pc:spChg chg="del">
+          <ac:chgData name="Pramod Naik" userId="ceb6df04-ef15-4d9b-a141-998a03559d75" providerId="ADAL" clId="{B158E975-0E20-43B3-8221-44D3D217A6A1}" dt="2025-06-27T18:03:08.992" v="100"/>
+          <ac:spMkLst>
+            <pc:docMk/>
+            <pc:sldMk cId="657032694" sldId="884"/>
+            <ac:spMk id="3" creationId="{832671CA-4741-6837-6823-B14961805251}"/>
+          </ac:spMkLst>
+        </pc:spChg>
+        <pc:spChg chg="add del mod">
+          <ac:chgData name="Pramod Naik" userId="ceb6df04-ef15-4d9b-a141-998a03559d75" providerId="ADAL" clId="{B158E975-0E20-43B3-8221-44D3D217A6A1}" dt="2025-06-27T18:03:29.368" v="107" actId="26606"/>
+          <ac:spMkLst>
+            <pc:docMk/>
+            <pc:sldMk cId="657032694" sldId="884"/>
+            <ac:spMk id="6" creationId="{783792E4-F83B-529F-1E17-4B14367636D0}"/>
+          </ac:spMkLst>
+        </pc:spChg>
+        <pc:spChg chg="add del mod">
+          <ac:chgData name="Pramod Naik" userId="ceb6df04-ef15-4d9b-a141-998a03559d75" providerId="ADAL" clId="{B158E975-0E20-43B3-8221-44D3D217A6A1}" dt="2025-06-27T18:03:29.368" v="107" actId="26606"/>
+          <ac:spMkLst>
+            <pc:docMk/>
+            <pc:sldMk cId="657032694" sldId="884"/>
+            <ac:spMk id="7" creationId="{DC36454C-E322-F3BC-0305-A982D3259C79}"/>
+          </ac:spMkLst>
+        </pc:spChg>
+        <pc:spChg chg="add del mod">
+          <ac:chgData name="Pramod Naik" userId="ceb6df04-ef15-4d9b-a141-998a03559d75" providerId="ADAL" clId="{B158E975-0E20-43B3-8221-44D3D217A6A1}" dt="2025-06-27T18:03:26.473" v="105" actId="26606"/>
+          <ac:spMkLst>
+            <pc:docMk/>
+            <pc:sldMk cId="657032694" sldId="884"/>
+            <ac:spMk id="9" creationId="{0683F341-FF80-3343-5EAB-C718BFEC7E58}"/>
+          </ac:spMkLst>
+        </pc:spChg>
+        <pc:spChg chg="add del mod">
+          <ac:chgData name="Pramod Naik" userId="ceb6df04-ef15-4d9b-a141-998a03559d75" providerId="ADAL" clId="{B158E975-0E20-43B3-8221-44D3D217A6A1}" dt="2025-06-27T18:03:26.473" v="105" actId="26606"/>
+          <ac:spMkLst>
+            <pc:docMk/>
+            <pc:sldMk cId="657032694" sldId="884"/>
+            <ac:spMk id="11" creationId="{5FED177A-8376-B81A-162C-F0463CCB1CCA}"/>
+          </ac:spMkLst>
+        </pc:spChg>
+        <pc:picChg chg="add mod">
+          <ac:chgData name="Pramod Naik" userId="ceb6df04-ef15-4d9b-a141-998a03559d75" providerId="ADAL" clId="{B158E975-0E20-43B3-8221-44D3D217A6A1}" dt="2025-06-27T18:04:01.784" v="113" actId="14100"/>
+          <ac:picMkLst>
+            <pc:docMk/>
+            <pc:sldMk cId="657032694" sldId="884"/>
+            <ac:picMk id="4" creationId="{D792691D-FA8B-3B03-6177-1D6FDD8097FF}"/>
+          </ac:picMkLst>
+        </pc:picChg>
+      </pc:sldChg>
+      <pc:sldChg chg="addSp delSp modSp mod">
+        <pc:chgData name="Pramod Naik" userId="ceb6df04-ef15-4d9b-a141-998a03559d75" providerId="ADAL" clId="{B158E975-0E20-43B3-8221-44D3D217A6A1}" dt="2025-06-27T18:10:46.986" v="201" actId="20577"/>
+        <pc:sldMkLst>
+          <pc:docMk/>
+          <pc:sldMk cId="1780658408" sldId="885"/>
+        </pc:sldMkLst>
+        <pc:spChg chg="add mod">
+          <ac:chgData name="Pramod Naik" userId="ceb6df04-ef15-4d9b-a141-998a03559d75" providerId="ADAL" clId="{B158E975-0E20-43B3-8221-44D3D217A6A1}" dt="2025-06-27T18:04:39.805" v="115"/>
+          <ac:spMkLst>
+            <pc:docMk/>
+            <pc:sldMk cId="1780658408" sldId="885"/>
+            <ac:spMk id="2" creationId="{49021E70-7B04-2677-DA50-DE9EB3977D6A}"/>
+          </ac:spMkLst>
+        </pc:spChg>
+        <pc:spChg chg="add del mod">
+          <ac:chgData name="Pramod Naik" userId="ceb6df04-ef15-4d9b-a141-998a03559d75" providerId="ADAL" clId="{B158E975-0E20-43B3-8221-44D3D217A6A1}" dt="2025-06-27T18:10:46.986" v="201" actId="20577"/>
+          <ac:spMkLst>
+            <pc:docMk/>
+            <pc:sldMk cId="1780658408" sldId="885"/>
+            <ac:spMk id="3" creationId="{0B113A24-2009-3ED7-FB8F-92F893241700}"/>
+          </ac:spMkLst>
+        </pc:spChg>
+      </pc:sldChg>
+    </pc:docChg>
+  </pc:docChgLst>
+</pc:chgInfo>
+</file>
+
 <file path=ppt/notesMasters/notesMaster1.xml><?xml version="1.0" encoding="utf-8"?>
 <p:notesMaster xmlns:a="http://schemas.openxmlformats.org/drawingml/2006/main" xmlns:r="http://schemas.openxmlformats.org/officeDocument/2006/relationships" xmlns:p="http://schemas.openxmlformats.org/presentationml/2006/main">
   <p:cSld>
@@ -242,7 +464,7 @@
           <a:p>
             <a:fld id="{D9B442E5-3501-493E-B556-8D78E402D194}" type="datetimeFigureOut">
               <a:rPr lang="en-IN" smtClean="0"/>
-              <a:t>22-06-2025</a:t>
+              <a:t>27-06-2025</a:t>
             </a:fld>
             <a:endParaRPr lang="en-IN"/>
           </a:p>
@@ -827,7 +1049,7 @@
           <a:p>
             <a:fld id="{050FF069-687C-4110-9C8F-B52BF36C2535}" type="datetimeFigureOut">
               <a:rPr lang="en-IN" smtClean="0"/>
-              <a:t>22-06-2025</a:t>
+              <a:t>27-06-2025</a:t>
             </a:fld>
             <a:endParaRPr lang="en-IN"/>
           </a:p>
@@ -1025,7 +1247,7 @@
           <a:p>
             <a:fld id="{050FF069-687C-4110-9C8F-B52BF36C2535}" type="datetimeFigureOut">
               <a:rPr lang="en-IN" smtClean="0"/>
-              <a:t>22-06-2025</a:t>
+              <a:t>27-06-2025</a:t>
             </a:fld>
             <a:endParaRPr lang="en-IN"/>
           </a:p>
@@ -1233,7 +1455,7 @@
           <a:p>
             <a:fld id="{050FF069-687C-4110-9C8F-B52BF36C2535}" type="datetimeFigureOut">
               <a:rPr lang="en-IN" smtClean="0"/>
-              <a:t>22-06-2025</a:t>
+              <a:t>27-06-2025</a:t>
             </a:fld>
             <a:endParaRPr lang="en-IN"/>
           </a:p>
@@ -1431,7 +1653,7 @@
           <a:p>
             <a:fld id="{050FF069-687C-4110-9C8F-B52BF36C2535}" type="datetimeFigureOut">
               <a:rPr lang="en-IN" smtClean="0"/>
-              <a:t>22-06-2025</a:t>
+              <a:t>27-06-2025</a:t>
             </a:fld>
             <a:endParaRPr lang="en-IN"/>
           </a:p>
@@ -1707,7 +1929,7 @@
           <a:p>
             <a:fld id="{050FF069-687C-4110-9C8F-B52BF36C2535}" type="datetimeFigureOut">
               <a:rPr lang="en-IN" smtClean="0"/>
-              <a:t>22-06-2025</a:t>
+              <a:t>27-06-2025</a:t>
             </a:fld>
             <a:endParaRPr lang="en-IN"/>
           </a:p>
@@ -1974,7 +2196,7 @@
           <a:p>
             <a:fld id="{050FF069-687C-4110-9C8F-B52BF36C2535}" type="datetimeFigureOut">
               <a:rPr lang="en-IN" smtClean="0"/>
-              <a:t>22-06-2025</a:t>
+              <a:t>27-06-2025</a:t>
             </a:fld>
             <a:endParaRPr lang="en-IN"/>
           </a:p>
@@ -2388,7 +2610,7 @@
           <a:p>
             <a:fld id="{050FF069-687C-4110-9C8F-B52BF36C2535}" type="datetimeFigureOut">
               <a:rPr lang="en-IN" smtClean="0"/>
-              <a:t>22-06-2025</a:t>
+              <a:t>27-06-2025</a:t>
             </a:fld>
             <a:endParaRPr lang="en-IN"/>
           </a:p>
@@ -2535,7 +2757,7 @@
           <a:p>
             <a:fld id="{050FF069-687C-4110-9C8F-B52BF36C2535}" type="datetimeFigureOut">
               <a:rPr lang="en-IN" smtClean="0"/>
-              <a:t>22-06-2025</a:t>
+              <a:t>27-06-2025</a:t>
             </a:fld>
             <a:endParaRPr lang="en-IN"/>
           </a:p>
@@ -2648,7 +2870,7 @@
           <a:p>
             <a:fld id="{050FF069-687C-4110-9C8F-B52BF36C2535}" type="datetimeFigureOut">
               <a:rPr lang="en-IN" smtClean="0"/>
-              <a:t>22-06-2025</a:t>
+              <a:t>27-06-2025</a:t>
             </a:fld>
             <a:endParaRPr lang="en-IN"/>
           </a:p>
@@ -2967,7 +3189,7 @@
           <a:p>
             <a:fld id="{050FF069-687C-4110-9C8F-B52BF36C2535}" type="datetimeFigureOut">
               <a:rPr lang="en-IN" smtClean="0"/>
-              <a:t>22-06-2025</a:t>
+              <a:t>27-06-2025</a:t>
             </a:fld>
             <a:endParaRPr lang="en-IN"/>
           </a:p>
@@ -3262,7 +3484,7 @@
           <a:p>
             <a:fld id="{050FF069-687C-4110-9C8F-B52BF36C2535}" type="datetimeFigureOut">
               <a:rPr lang="en-IN" smtClean="0"/>
-              <a:t>22-06-2025</a:t>
+              <a:t>27-06-2025</a:t>
             </a:fld>
             <a:endParaRPr lang="en-IN"/>
           </a:p>
@@ -4647,7 +4869,7 @@
           <a:p>
             <a:fld id="{050FF069-687C-4110-9C8F-B52BF36C2535}" type="datetimeFigureOut">
               <a:rPr lang="en-IN" smtClean="0"/>
-              <a:t>22-06-2025</a:t>
+              <a:t>27-06-2025</a:t>
             </a:fld>
             <a:endParaRPr lang="en-IN"/>
           </a:p>
@@ -5368,7 +5590,7 @@
               <a:buAutoNum type="arabicPeriod"/>
             </a:pPr>
             <a:r>
-              <a:rPr lang="en-IN" sz="1800" kern="100" dirty="0">
+              <a:rPr lang="en-IN" sz="1800" b="1" kern="100" dirty="0">
                 <a:effectLst/>
                 <a:latin typeface="Aptos" panose="020B0004020202020204" pitchFamily="34" charset="0"/>
                 <a:ea typeface="Aptos" panose="020B0004020202020204" pitchFamily="34" charset="0"/>
@@ -5410,7 +5632,25 @@
                 <a:ea typeface="Aptos" panose="020B0004020202020204" pitchFamily="34" charset="0"/>
                 <a:cs typeface="Tunga" panose="020B0502040204020203" pitchFamily="34" charset="0"/>
               </a:rPr>
-              <a:t>Write a program to demonstrate the working of the decision tree  based  ID3 algorithm. Use an appropriate data set for building the decision tree and apply this knowledge to classify a new sample. </a:t>
+              <a:t>Write a program to demonstrate the working of the </a:t>
+            </a:r>
+            <a:r>
+              <a:rPr lang="en-IN" sz="1800" b="1" kern="100" dirty="0">
+                <a:effectLst/>
+                <a:latin typeface="Aptos" panose="020B0004020202020204" pitchFamily="34" charset="0"/>
+                <a:ea typeface="Aptos" panose="020B0004020202020204" pitchFamily="34" charset="0"/>
+                <a:cs typeface="Tunga" panose="020B0502040204020203" pitchFamily="34" charset="0"/>
+              </a:rPr>
+              <a:t>decision tree  </a:t>
+            </a:r>
+            <a:r>
+              <a:rPr lang="en-IN" sz="1800" kern="100" dirty="0">
+                <a:effectLst/>
+                <a:latin typeface="Aptos" panose="020B0004020202020204" pitchFamily="34" charset="0"/>
+                <a:ea typeface="Aptos" panose="020B0004020202020204" pitchFamily="34" charset="0"/>
+                <a:cs typeface="Tunga" panose="020B0502040204020203" pitchFamily="34" charset="0"/>
+              </a:rPr>
+              <a:t>based  ID3 algorithm. Use an appropriate data set for building the decision tree and apply this knowledge to classify a new sample. </a:t>
             </a:r>
           </a:p>
           <a:p>
@@ -5428,7 +5668,25 @@
                 <a:ea typeface="Aptos" panose="020B0004020202020204" pitchFamily="34" charset="0"/>
                 <a:cs typeface="Tunga" panose="020B0502040204020203" pitchFamily="34" charset="0"/>
               </a:rPr>
-              <a:t>Write a program to implement the naïve Bayesian classifier for a sample training  data set stored as a .CSV file. Compute the accuracy of the classifier, considering few test data sets. </a:t>
+              <a:t>Write a program to implement the naïve </a:t>
+            </a:r>
+            <a:r>
+              <a:rPr lang="en-IN" sz="1800" b="1" kern="100" dirty="0">
+                <a:effectLst/>
+                <a:latin typeface="Aptos" panose="020B0004020202020204" pitchFamily="34" charset="0"/>
+                <a:ea typeface="Aptos" panose="020B0004020202020204" pitchFamily="34" charset="0"/>
+                <a:cs typeface="Tunga" panose="020B0502040204020203" pitchFamily="34" charset="0"/>
+              </a:rPr>
+              <a:t>Bayesian classifier </a:t>
+            </a:r>
+            <a:r>
+              <a:rPr lang="en-IN" sz="1800" kern="100" dirty="0">
+                <a:effectLst/>
+                <a:latin typeface="Aptos" panose="020B0004020202020204" pitchFamily="34" charset="0"/>
+                <a:ea typeface="Aptos" panose="020B0004020202020204" pitchFamily="34" charset="0"/>
+                <a:cs typeface="Tunga" panose="020B0502040204020203" pitchFamily="34" charset="0"/>
+              </a:rPr>
+              <a:t>for a sample training  data set stored as a .CSV file. Compute the accuracy of the classifier, considering few test data sets. </a:t>
             </a:r>
           </a:p>
           <a:p>
@@ -5440,7 +5698,7 @@
               <a:buAutoNum type="arabicPeriod"/>
             </a:pPr>
             <a:r>
-              <a:rPr lang="en-IN" sz="1800" kern="100" dirty="0">
+              <a:rPr lang="en-IN" sz="1800" b="1" kern="100" dirty="0">
                 <a:effectLst/>
                 <a:latin typeface="Aptos" panose="020B0004020202020204" pitchFamily="34" charset="0"/>
                 <a:ea typeface="Aptos" panose="020B0004020202020204" pitchFamily="34" charset="0"/>
@@ -5482,7 +5740,28 @@
                 <a:ea typeface="Aptos" panose="020B0004020202020204" pitchFamily="34" charset="0"/>
                 <a:cs typeface="Tunga" panose="020B0502040204020203" pitchFamily="34" charset="0"/>
               </a:rPr>
-              <a:t>Write a program to demonstrate Regression analysis with residual plots on a given data set. </a:t>
+              <a:t>Write a program to demonstrate </a:t>
+            </a:r>
+            <a:r>
+              <a:rPr lang="en-IN" sz="1800" b="1" kern="100" dirty="0">
+                <a:solidFill>
+                  <a:srgbClr val="C00000"/>
+                </a:solidFill>
+                <a:effectLst/>
+                <a:latin typeface="Aptos" panose="020B0004020202020204" pitchFamily="34" charset="0"/>
+                <a:ea typeface="Aptos" panose="020B0004020202020204" pitchFamily="34" charset="0"/>
+                <a:cs typeface="Tunga" panose="020B0502040204020203" pitchFamily="34" charset="0"/>
+              </a:rPr>
+              <a:t>Regression analysis </a:t>
+            </a:r>
+            <a:r>
+              <a:rPr lang="en-IN" sz="1800" kern="100" dirty="0">
+                <a:effectLst/>
+                <a:latin typeface="Aptos" panose="020B0004020202020204" pitchFamily="34" charset="0"/>
+                <a:ea typeface="Aptos" panose="020B0004020202020204" pitchFamily="34" charset="0"/>
+                <a:cs typeface="Tunga" panose="020B0502040204020203" pitchFamily="34" charset="0"/>
+              </a:rPr>
+              <a:t>with residual plots on a given data set. </a:t>
             </a:r>
           </a:p>
           <a:p>
@@ -5521,7 +5800,28 @@
                 <a:ea typeface="Aptos" panose="020B0004020202020204" pitchFamily="34" charset="0"/>
                 <a:cs typeface="Tunga" panose="020B0502040204020203" pitchFamily="34" charset="0"/>
               </a:rPr>
-              <a:t>Write a program to implement k-Means clustering algorithm to cluster the set of data stored in .CSV file.</a:t>
+              <a:t>Write a program to implement </a:t>
+            </a:r>
+            <a:r>
+              <a:rPr lang="en-IN" sz="1800" b="1" kern="100" dirty="0">
+                <a:solidFill>
+                  <a:srgbClr val="C00000"/>
+                </a:solidFill>
+                <a:effectLst/>
+                <a:latin typeface="Aptos" panose="020B0004020202020204" pitchFamily="34" charset="0"/>
+                <a:ea typeface="Aptos" panose="020B0004020202020204" pitchFamily="34" charset="0"/>
+                <a:cs typeface="Tunga" panose="020B0502040204020203" pitchFamily="34" charset="0"/>
+              </a:rPr>
+              <a:t>k-Means</a:t>
+            </a:r>
+            <a:r>
+              <a:rPr lang="en-IN" sz="1800" kern="100" dirty="0">
+                <a:effectLst/>
+                <a:latin typeface="Aptos" panose="020B0004020202020204" pitchFamily="34" charset="0"/>
+                <a:ea typeface="Aptos" panose="020B0004020202020204" pitchFamily="34" charset="0"/>
+                <a:cs typeface="Tunga" panose="020B0502040204020203" pitchFamily="34" charset="0"/>
+              </a:rPr>
+              <a:t> clustering algorithm to cluster the set of data stored in .CSV file.</a:t>
             </a:r>
           </a:p>
         </p:txBody>
@@ -13449,10 +13749,10 @@
       </p:grpSpPr>
       <p:sp>
         <p:nvSpPr>
-          <p:cNvPr id="3" name="Content Placeholder 2">
+          <p:cNvPr id="6" name="Content Placeholder 5">
             <a:extLst>
               <a:ext uri="{FF2B5EF4-FFF2-40B4-BE49-F238E27FC236}">
-                <a16:creationId xmlns:a16="http://schemas.microsoft.com/office/drawing/2014/main" id="{B4D3738A-AEF2-C7DB-AC19-B497A84E759C}"/>
+                <a16:creationId xmlns:a16="http://schemas.microsoft.com/office/drawing/2014/main" id="{E676727A-A98A-CFFE-78B9-67953E38B818}"/>
               </a:ext>
             </a:extLst>
           </p:cNvPr>
@@ -13463,25 +13763,45 @@
             <p:ph idx="1"/>
           </p:nvPr>
         </p:nvSpPr>
+        <p:spPr/>
+        <p:txBody>
+          <a:bodyPr/>
+          <a:lstStyle/>
+          <a:p>
+            <a:endParaRPr lang="en-IN"/>
+          </a:p>
+        </p:txBody>
+      </p:sp>
+      <p:pic>
+        <p:nvPicPr>
+          <p:cNvPr id="8" name="Picture 7">
+            <a:extLst>
+              <a:ext uri="{FF2B5EF4-FFF2-40B4-BE49-F238E27FC236}">
+                <a16:creationId xmlns:a16="http://schemas.microsoft.com/office/drawing/2014/main" id="{792885F3-E777-6FF4-A4AE-F9854940E0D7}"/>
+              </a:ext>
+            </a:extLst>
+          </p:cNvPr>
+          <p:cNvPicPr>
+            <a:picLocks noChangeAspect="1"/>
+          </p:cNvPicPr>
+          <p:nvPr/>
+        </p:nvPicPr>
+        <p:blipFill>
+          <a:blip r:embed="rId2"/>
+          <a:stretch>
+            <a:fillRect/>
+          </a:stretch>
+        </p:blipFill>
         <p:spPr>
           <a:xfrm>
-            <a:off x="702853" y="613317"/>
-            <a:ext cx="10900568" cy="5286740"/>
+            <a:off x="-1" y="0"/>
+            <a:ext cx="14543651" cy="6629400"/>
           </a:xfrm>
+          <a:prstGeom prst="rect">
+            <a:avLst/>
+          </a:prstGeom>
         </p:spPr>
-        <p:txBody>
-          <a:bodyPr>
-            <a:normAutofit/>
-          </a:bodyPr>
-          <a:lstStyle/>
-          <a:p>
-            <a:pPr marL="0" indent="0">
-              <a:buNone/>
-            </a:pPr>
-            <a:endParaRPr lang="en-IN" sz="2400" dirty="0"/>
-          </a:p>
-        </p:txBody>
-      </p:sp>
+      </p:pic>
     </p:spTree>
     <p:extLst>
       <p:ext uri="{BB962C8B-B14F-4D97-AF65-F5344CB8AC3E}">
@@ -13553,6 +13873,36 @@
           </a:p>
         </p:txBody>
       </p:sp>
+      <p:pic>
+        <p:nvPicPr>
+          <p:cNvPr id="4" name="Picture 3">
+            <a:extLst>
+              <a:ext uri="{FF2B5EF4-FFF2-40B4-BE49-F238E27FC236}">
+                <a16:creationId xmlns:a16="http://schemas.microsoft.com/office/drawing/2014/main" id="{7242F791-B1DC-AFB4-538A-6DE3F7FBA03F}"/>
+              </a:ext>
+            </a:extLst>
+          </p:cNvPr>
+          <p:cNvPicPr>
+            <a:picLocks noChangeAspect="1"/>
+          </p:cNvPicPr>
+          <p:nvPr/>
+        </p:nvPicPr>
+        <p:blipFill>
+          <a:blip r:embed="rId2"/>
+          <a:stretch>
+            <a:fillRect/>
+          </a:stretch>
+        </p:blipFill>
+        <p:spPr>
+          <a:xfrm>
+            <a:off x="0" y="685804"/>
+            <a:ext cx="13136016" cy="4789714"/>
+          </a:xfrm>
+          <a:prstGeom prst="rect">
+            <a:avLst/>
+          </a:prstGeom>
+        </p:spPr>
+      </p:pic>
     </p:spTree>
     <p:extLst>
       <p:ext uri="{BB962C8B-B14F-4D97-AF65-F5344CB8AC3E}">
@@ -13624,6 +13974,36 @@
           </a:p>
         </p:txBody>
       </p:sp>
+      <p:pic>
+        <p:nvPicPr>
+          <p:cNvPr id="4" name="Picture 3">
+            <a:extLst>
+              <a:ext uri="{FF2B5EF4-FFF2-40B4-BE49-F238E27FC236}">
+                <a16:creationId xmlns:a16="http://schemas.microsoft.com/office/drawing/2014/main" id="{A85D3C9D-27D8-9CF3-A671-5891C564A36F}"/>
+              </a:ext>
+            </a:extLst>
+          </p:cNvPr>
+          <p:cNvPicPr>
+            <a:picLocks noChangeAspect="1"/>
+          </p:cNvPicPr>
+          <p:nvPr/>
+        </p:nvPicPr>
+        <p:blipFill>
+          <a:blip r:embed="rId2"/>
+          <a:stretch>
+            <a:fillRect/>
+          </a:stretch>
+        </p:blipFill>
+        <p:spPr>
+          <a:xfrm>
+            <a:off x="0" y="1149286"/>
+            <a:ext cx="12473636" cy="3107028"/>
+          </a:xfrm>
+          <a:prstGeom prst="rect">
+            <a:avLst/>
+          </a:prstGeom>
+        </p:spPr>
+      </p:pic>
     </p:spTree>
     <p:extLst>
       <p:ext uri="{BB962C8B-B14F-4D97-AF65-F5344CB8AC3E}">
@@ -13691,7 +14071,36 @@
             <a:pPr marL="0" indent="0">
               <a:buNone/>
             </a:pPr>
-            <a:endParaRPr lang="en-IN" sz="2400" dirty="0"/>
+            <a:r>
+              <a:rPr lang="en-IN" sz="3200" kern="100" dirty="0">
+                <a:latin typeface="Aptos" panose="020B0004020202020204" pitchFamily="34" charset="0"/>
+                <a:ea typeface="Aptos" panose="020B0004020202020204" pitchFamily="34" charset="0"/>
+                <a:cs typeface="Tunga" panose="020B0502040204020203" pitchFamily="34" charset="0"/>
+              </a:rPr>
+              <a:t>3. Write a program to demonstrate the working of the </a:t>
+            </a:r>
+            <a:r>
+              <a:rPr lang="en-IN" sz="3200" b="1" kern="100" dirty="0">
+                <a:latin typeface="Aptos" panose="020B0004020202020204" pitchFamily="34" charset="0"/>
+                <a:ea typeface="Aptos" panose="020B0004020202020204" pitchFamily="34" charset="0"/>
+                <a:cs typeface="Tunga" panose="020B0502040204020203" pitchFamily="34" charset="0"/>
+              </a:rPr>
+              <a:t>decision tree  </a:t>
+            </a:r>
+            <a:r>
+              <a:rPr lang="en-IN" sz="3200" kern="100" dirty="0">
+                <a:latin typeface="Aptos" panose="020B0004020202020204" pitchFamily="34" charset="0"/>
+                <a:ea typeface="Aptos" panose="020B0004020202020204" pitchFamily="34" charset="0"/>
+                <a:cs typeface="Tunga" panose="020B0502040204020203" pitchFamily="34" charset="0"/>
+              </a:rPr>
+              <a:t>based  ID3 algorithm. Use an appropriate data set for building the decision tree and apply this knowledge to classify a new sample. </a:t>
+            </a:r>
+          </a:p>
+          <a:p>
+            <a:pPr marL="0" indent="0">
+              <a:buNone/>
+            </a:pPr>
+            <a:endParaRPr lang="en-IN" sz="3200" dirty="0"/>
           </a:p>
         </p:txBody>
       </p:sp>
@@ -13749,8 +14158,8 @@
         </p:nvSpPr>
         <p:spPr>
           <a:xfrm>
-            <a:off x="702853" y="968829"/>
-            <a:ext cx="10900568" cy="4931228"/>
+            <a:off x="702853" y="304800"/>
+            <a:ext cx="10900568" cy="6106886"/>
           </a:xfrm>
         </p:spPr>
         <p:txBody>
@@ -13758,6 +14167,131 @@
             <a:normAutofit/>
           </a:bodyPr>
           <a:lstStyle/>
+          <a:p>
+            <a:pPr marL="0" indent="0">
+              <a:buNone/>
+            </a:pPr>
+            <a:r>
+              <a:rPr lang="en-US" sz="2400" b="1" dirty="0"/>
+              <a:t>🧠 What is ID3?</a:t>
+            </a:r>
+          </a:p>
+          <a:p>
+            <a:pPr marL="0" indent="0">
+              <a:buNone/>
+            </a:pPr>
+            <a:r>
+              <a:rPr lang="en-US" sz="2400" dirty="0"/>
+              <a:t>ID3 (Iterative Dichotomiser 3) is a popular decision tree algorithm used in machine learning for classification tasks.</a:t>
+            </a:r>
+          </a:p>
+          <a:p>
+            <a:pPr marL="0" indent="0">
+              <a:buNone/>
+            </a:pPr>
+            <a:r>
+              <a:rPr lang="en-US" sz="2400" b="1" dirty="0"/>
+              <a:t>Dichotomiser means</a:t>
+            </a:r>
+            <a:r>
+              <a:rPr lang="en-US" sz="2400" dirty="0"/>
+              <a:t> :to divide into two parts, classes, or groups</a:t>
+            </a:r>
+          </a:p>
+          <a:p>
+            <a:pPr marL="0" indent="0">
+              <a:buNone/>
+            </a:pPr>
+            <a:r>
+              <a:rPr lang="en-US" sz="2400" b="1" dirty="0"/>
+              <a:t>🔍 Core Idea of ID3</a:t>
+            </a:r>
+          </a:p>
+          <a:p>
+            <a:pPr marL="0" indent="0">
+              <a:buNone/>
+            </a:pPr>
+            <a:r>
+              <a:rPr lang="en-US" sz="2400" dirty="0"/>
+              <a:t>ID3 builds a decision tree by selecting the attribute that gives the maximum information gain at each node.</a:t>
+            </a:r>
+          </a:p>
+          <a:p>
+            <a:pPr marL="0" indent="0">
+              <a:buNone/>
+            </a:pPr>
+            <a:endParaRPr lang="en-US" sz="2400" dirty="0"/>
+          </a:p>
+          <a:p>
+            <a:pPr marL="0" indent="0">
+              <a:buNone/>
+            </a:pPr>
+            <a:r>
+              <a:rPr lang="en-US" sz="2400" b="1" dirty="0"/>
+              <a:t>It uses:</a:t>
+            </a:r>
+          </a:p>
+          <a:p>
+            <a:r>
+              <a:rPr lang="en-US" sz="2400" b="1" dirty="0"/>
+              <a:t>Entropy →</a:t>
+            </a:r>
+            <a:r>
+              <a:rPr lang="en-US" sz="2400" dirty="0"/>
+              <a:t> Measures the impurity (or disorder) in a dataset</a:t>
+            </a:r>
+          </a:p>
+          <a:p>
+            <a:r>
+              <a:rPr lang="en-US" sz="2400" b="1" dirty="0"/>
+              <a:t>Information Gain </a:t>
+            </a:r>
+            <a:r>
+              <a:rPr lang="en-US" sz="2400" dirty="0"/>
+              <a:t>→ How much entropy is reduced by splitting on an attribute</a:t>
+            </a:r>
+          </a:p>
+          <a:p>
+            <a:pPr marL="0" indent="0">
+              <a:buNone/>
+            </a:pPr>
+            <a:endParaRPr lang="en-US" sz="2400" dirty="0"/>
+          </a:p>
+          <a:p>
+            <a:pPr marL="0" indent="0">
+              <a:buNone/>
+            </a:pPr>
+            <a:r>
+              <a:rPr lang="en-US" sz="2400" b="1" dirty="0"/>
+              <a:t>Note: Impurity</a:t>
+            </a:r>
+            <a:r>
+              <a:rPr lang="en-US" sz="2400" dirty="0"/>
+              <a:t> means how </a:t>
+            </a:r>
+            <a:r>
+              <a:rPr lang="en-US" sz="2400" b="1" dirty="0"/>
+              <a:t>mixed or disordered</a:t>
+            </a:r>
+            <a:r>
+              <a:rPr lang="en-US" sz="2400" dirty="0"/>
+              <a:t> a group of data is with respect to its </a:t>
+            </a:r>
+            <a:r>
+              <a:rPr lang="en-US" sz="2400" b="1" dirty="0"/>
+              <a:t>target labels</a:t>
+            </a:r>
+            <a:r>
+              <a:rPr lang="en-US" sz="2400" dirty="0"/>
+              <a:t> (like "Yes" or "No").</a:t>
+            </a:r>
+          </a:p>
+          <a:p>
+            <a:pPr marL="0" indent="0">
+              <a:buNone/>
+            </a:pPr>
+            <a:endParaRPr lang="en-US" sz="2400" dirty="0"/>
+          </a:p>
           <a:p>
             <a:pPr marL="0" indent="0">
               <a:buNone/>
@@ -14063,41 +14597,41 @@
           <a:chExt cx="0" cy="0"/>
         </a:xfrm>
       </p:grpSpPr>
-      <p:sp>
-        <p:nvSpPr>
-          <p:cNvPr id="3" name="Content Placeholder 2">
+      <p:pic>
+        <p:nvPicPr>
+          <p:cNvPr id="4" name="Content Placeholder 3" descr="A diagram of a tennis game&#10;&#10;AI-generated content may be incorrect.">
             <a:extLst>
               <a:ext uri="{FF2B5EF4-FFF2-40B4-BE49-F238E27FC236}">
-                <a16:creationId xmlns:a16="http://schemas.microsoft.com/office/drawing/2014/main" id="{832671CA-4741-6837-6823-B14961805251}"/>
+                <a16:creationId xmlns:a16="http://schemas.microsoft.com/office/drawing/2014/main" id="{D792691D-FA8B-3B03-6177-1D6FDD8097FF}"/>
               </a:ext>
             </a:extLst>
           </p:cNvPr>
-          <p:cNvSpPr>
-            <a:spLocks noGrp="1"/>
-          </p:cNvSpPr>
+          <p:cNvPicPr>
+            <a:picLocks noGrp="1" noChangeAspect="1"/>
+          </p:cNvPicPr>
           <p:nvPr>
             <p:ph idx="1"/>
           </p:nvPr>
-        </p:nvSpPr>
+        </p:nvPicPr>
+        <p:blipFill>
+          <a:blip r:embed="rId2">
+            <a:extLst>
+              <a:ext uri="{28A0092B-C50C-407E-A947-70E740481C1C}">
+                <a14:useLocalDpi xmlns:a14="http://schemas.microsoft.com/office/drawing/2010/main" val="0"/>
+              </a:ext>
+            </a:extLst>
+          </a:blip>
+          <a:stretch>
+            <a:fillRect/>
+          </a:stretch>
+        </p:blipFill>
         <p:spPr>
           <a:xfrm>
-            <a:off x="702853" y="968829"/>
-            <a:ext cx="10900568" cy="4931228"/>
+            <a:off x="0" y="-228600"/>
+            <a:ext cx="12191999" cy="7315200"/>
           </a:xfrm>
         </p:spPr>
-        <p:txBody>
-          <a:bodyPr>
-            <a:normAutofit/>
-          </a:bodyPr>
-          <a:lstStyle/>
-          <a:p>
-            <a:pPr marL="0" indent="0">
-              <a:buNone/>
-            </a:pPr>
-            <a:endParaRPr lang="en-IN" sz="2400" dirty="0"/>
-          </a:p>
-        </p:txBody>
-      </p:sp>
+      </p:pic>
     </p:spTree>
     <p:extLst>
       <p:ext uri="{BB962C8B-B14F-4D97-AF65-F5344CB8AC3E}">
@@ -14152,8 +14686,8 @@
         </p:nvSpPr>
         <p:spPr>
           <a:xfrm>
-            <a:off x="702853" y="968829"/>
-            <a:ext cx="10900568" cy="4931228"/>
+            <a:off x="811710" y="957943"/>
+            <a:ext cx="10748918" cy="4691743"/>
           </a:xfrm>
         </p:spPr>
         <p:txBody>
@@ -14165,6 +14699,151 @@
             <a:pPr marL="0" indent="0">
               <a:buNone/>
             </a:pPr>
+            <a:r>
+              <a:rPr lang="en-US" sz="2800" b="1" dirty="0"/>
+              <a:t>📘 How to Read the Tree:</a:t>
+            </a:r>
+          </a:p>
+          <a:p>
+            <a:pPr marL="0" indent="0">
+              <a:buNone/>
+            </a:pPr>
+            <a:r>
+              <a:rPr lang="en-US" sz="2400" dirty="0"/>
+              <a:t>Each box in the tree is a decision node or leaf. It contains:</a:t>
+            </a:r>
+          </a:p>
+          <a:p>
+            <a:pPr marL="457200" indent="-457200">
+              <a:buFont typeface="+mj-lt"/>
+              <a:buAutoNum type="arabicPeriod"/>
+            </a:pPr>
+            <a:r>
+              <a:rPr lang="en-US" sz="2400" dirty="0"/>
+              <a:t>A </a:t>
+            </a:r>
+            <a:r>
+              <a:rPr lang="en-US" sz="2400" b="1" dirty="0">
+                <a:solidFill>
+                  <a:schemeClr val="tx2">
+                    <a:lumMod val="75000"/>
+                    <a:lumOff val="25000"/>
+                  </a:schemeClr>
+                </a:solidFill>
+              </a:rPr>
+              <a:t>condition</a:t>
+            </a:r>
+            <a:r>
+              <a:rPr lang="en-US" sz="2400" dirty="0"/>
+              <a:t> to test (e.g., Outlook &lt;= 0.5) -&gt; It tells Should I go left or right? Like Conditional Statement.</a:t>
+            </a:r>
+          </a:p>
+          <a:p>
+            <a:pPr marL="457200" indent="-457200">
+              <a:buFont typeface="+mj-lt"/>
+              <a:buAutoNum type="arabicPeriod"/>
+            </a:pPr>
+            <a:r>
+              <a:rPr lang="en-US" sz="2400" b="1" dirty="0">
+                <a:solidFill>
+                  <a:schemeClr val="tx2">
+                    <a:lumMod val="75000"/>
+                    <a:lumOff val="25000"/>
+                  </a:schemeClr>
+                </a:solidFill>
+              </a:rPr>
+              <a:t>Entropy</a:t>
+            </a:r>
+            <a:r>
+              <a:rPr lang="en-US" sz="2400" dirty="0"/>
+              <a:t> → how </a:t>
+            </a:r>
+            <a:r>
+              <a:rPr lang="en-US" sz="2400" b="1" dirty="0">
+                <a:solidFill>
+                  <a:schemeClr val="tx2">
+                    <a:lumMod val="75000"/>
+                    <a:lumOff val="25000"/>
+                  </a:schemeClr>
+                </a:solidFill>
+              </a:rPr>
+              <a:t>impure</a:t>
+            </a:r>
+            <a:r>
+              <a:rPr lang="en-US" sz="2400" dirty="0"/>
+              <a:t> (Mixed values) this node is (0 means pure)</a:t>
+            </a:r>
+          </a:p>
+          <a:p>
+            <a:pPr marL="457200" indent="-457200">
+              <a:buFont typeface="+mj-lt"/>
+              <a:buAutoNum type="arabicPeriod"/>
+            </a:pPr>
+            <a:r>
+              <a:rPr lang="en-US" sz="2400" b="1" dirty="0">
+                <a:solidFill>
+                  <a:schemeClr val="tx2">
+                    <a:lumMod val="75000"/>
+                    <a:lumOff val="25000"/>
+                  </a:schemeClr>
+                </a:solidFill>
+              </a:rPr>
+              <a:t>Samples</a:t>
+            </a:r>
+            <a:r>
+              <a:rPr lang="en-US" sz="2400" dirty="0"/>
+              <a:t> → how many records reached this node</a:t>
+            </a:r>
+          </a:p>
+          <a:p>
+            <a:pPr marL="457200" indent="-457200">
+              <a:buFont typeface="+mj-lt"/>
+              <a:buAutoNum type="arabicPeriod"/>
+            </a:pPr>
+            <a:r>
+              <a:rPr lang="en-US" sz="2400" b="1" dirty="0">
+                <a:solidFill>
+                  <a:schemeClr val="tx2">
+                    <a:lumMod val="75000"/>
+                    <a:lumOff val="25000"/>
+                  </a:schemeClr>
+                </a:solidFill>
+              </a:rPr>
+              <a:t>Value</a:t>
+            </a:r>
+            <a:r>
+              <a:rPr lang="en-US" sz="2400" dirty="0"/>
+              <a:t> = [No, Yes] → count </a:t>
+            </a:r>
+            <a:r>
+              <a:rPr lang="en-US" sz="2400"/>
+              <a:t>of class labels </a:t>
+            </a:r>
+            <a:r>
+              <a:rPr lang="en-US" sz="2400" dirty="0"/>
+              <a:t>at this node</a:t>
+            </a:r>
+          </a:p>
+          <a:p>
+            <a:pPr marL="457200" indent="-457200">
+              <a:buFont typeface="+mj-lt"/>
+              <a:buAutoNum type="arabicPeriod"/>
+            </a:pPr>
+            <a:r>
+              <a:rPr lang="en-US" sz="2400" b="1" dirty="0">
+                <a:solidFill>
+                  <a:schemeClr val="tx2">
+                    <a:lumMod val="75000"/>
+                    <a:lumOff val="25000"/>
+                  </a:schemeClr>
+                </a:solidFill>
+              </a:rPr>
+              <a:t>Class</a:t>
+            </a:r>
+            <a:r>
+              <a:rPr lang="en-US" sz="2400" dirty="0"/>
+              <a:t> → predicted class at this node (No or Yes)</a:t>
+            </a:r>
             <a:endParaRPr lang="en-IN" sz="2400" dirty="0"/>
           </a:p>
         </p:txBody>

</xml_diff>